<commit_message>
Uploading the hackathon artifacts
</commit_message>
<xml_diff>
--- a/documentation/Connectorthon_Submission_Beaconstac.pptx
+++ b/documentation/Connectorthon_Submission_Beaconstac.pptx
@@ -5,33 +5,41 @@
     <p:sldMasterId id="2147483648" r:id="rId1"/>
   </p:sldMasterIdLst>
   <p:notesMasterIdLst>
-    <p:notesMasterId r:id="rId6"/>
+    <p:notesMasterId r:id="rId7"/>
   </p:notesMasterIdLst>
   <p:sldIdLst>
     <p:sldId id="366" r:id="rId2"/>
     <p:sldId id="367" r:id="rId3"/>
     <p:sldId id="369" r:id="rId4"/>
-    <p:sldId id="368" r:id="rId5"/>
+    <p:sldId id="370" r:id="rId5"/>
+    <p:sldId id="368" r:id="rId6"/>
   </p:sldIdLst>
   <p:sldSz cx="12192000" cy="6858000"/>
   <p:notesSz cx="6858000" cy="9144000"/>
   <p:embeddedFontLst>
     <p:embeddedFont>
+      <p:font typeface="Calibri" panose="020F0502020204030204" pitchFamily="34" charset="0"/>
+      <p:regular r:id="rId8"/>
+      <p:bold r:id="rId9"/>
+      <p:italic r:id="rId10"/>
+      <p:boldItalic r:id="rId11"/>
+    </p:embeddedFont>
+    <p:embeddedFont>
       <p:font typeface="Rubik" panose="00000500000000000000" pitchFamily="50" charset="-79"/>
-      <p:regular r:id="rId7"/>
-      <p:bold r:id="rId8"/>
-      <p:italic r:id="rId9"/>
+      <p:regular r:id="rId12"/>
+      <p:bold r:id="rId13"/>
+      <p:italic r:id="rId14"/>
     </p:embeddedFont>
     <p:embeddedFont>
       <p:font typeface="Trebuchet MS" panose="020B0603020202020204" pitchFamily="34" charset="0"/>
-      <p:regular r:id="rId10"/>
-      <p:bold r:id="rId11"/>
-      <p:italic r:id="rId12"/>
-      <p:boldItalic r:id="rId13"/>
+      <p:regular r:id="rId15"/>
+      <p:bold r:id="rId16"/>
+      <p:italic r:id="rId17"/>
+      <p:boldItalic r:id="rId18"/>
     </p:embeddedFont>
   </p:embeddedFontLst>
   <p:custDataLst>
-    <p:tags r:id="rId14"/>
+    <p:tags r:id="rId19"/>
   </p:custDataLst>
   <p:defaultTextStyle>
     <a:defPPr>
@@ -223,7 +231,7 @@
             <a:fld id="{CFA44459-8680-4AD3-8D18-9EF0845F156E}" type="datetimeFigureOut">
               <a:rPr lang="en-US"/>
               <a:pPr/>
-              <a:t>2/1/2022</a:t>
+              <a:t>2/2/2022</a:t>
             </a:fld>
             <a:endParaRPr lang="en-US" dirty="0"/>
           </a:p>
@@ -731,7 +739,7 @@
             <a:fld id="{83316E30-EEB7-4740-B0AB-5BFB7F8E5764}" type="slidenum">
               <a:rPr lang="en-US"/>
               <a:pPr/>
-              <a:t>4</a:t>
+              <a:t>5</a:t>
             </a:fld>
             <a:endParaRPr lang="en-US" dirty="0"/>
           </a:p>
@@ -1414,7 +1422,7 @@
             <a:fld id="{748832CA-DCD2-41B3-96D1-6E92E8FA8B22}" type="datetime1">
               <a:rPr lang="en-US"/>
               <a:pPr/>
-              <a:t>2/1/2022</a:t>
+              <a:t>2/2/2022</a:t>
             </a:fld>
             <a:endParaRPr lang="en-US" dirty="0"/>
           </a:p>
@@ -3414,7 +3422,7 @@
             <a:fld id="{91D32E29-F823-4652-9AE9-2D2F132296DA}" type="datetime1">
               <a:rPr lang="en-US"/>
               <a:pPr/>
-              <a:t>2/1/2022</a:t>
+              <a:t>2/2/2022</a:t>
             </a:fld>
             <a:endParaRPr lang="en-US" dirty="0"/>
           </a:p>
@@ -4428,7 +4436,7 @@
             <a:fld id="{04A728B0-2EE8-4602-849F-D2D469FDAEE2}" type="datetime1">
               <a:rPr lang="en-US"/>
               <a:pPr/>
-              <a:t>2/1/2022</a:t>
+              <a:t>2/2/2022</a:t>
             </a:fld>
             <a:endParaRPr lang="en-US" dirty="0"/>
           </a:p>
@@ -4698,7 +4706,7 @@
             <a:fld id="{04A728B0-2EE8-4602-849F-D2D469FDAEE2}" type="datetime1">
               <a:rPr lang="en-US"/>
               <a:pPr/>
-              <a:t>2/1/2022</a:t>
+              <a:t>2/2/2022</a:t>
             </a:fld>
             <a:endParaRPr lang="en-US" dirty="0"/>
           </a:p>
@@ -7408,7 +7416,7 @@
             <a:fld id="{04A728B0-2EE8-4602-849F-D2D469FDAEE2}" type="datetime1">
               <a:rPr lang="en-US"/>
               <a:pPr/>
-              <a:t>2/1/2022</a:t>
+              <a:t>2/2/2022</a:t>
             </a:fld>
             <a:endParaRPr lang="en-US" dirty="0"/>
           </a:p>
@@ -10111,7 +10119,7 @@
             <a:fld id="{04A728B0-2EE8-4602-849F-D2D469FDAEE2}" type="datetime1">
               <a:rPr lang="en-US"/>
               <a:pPr/>
-              <a:t>2/1/2022</a:t>
+              <a:t>2/2/2022</a:t>
             </a:fld>
             <a:endParaRPr lang="en-US" dirty="0"/>
           </a:p>
@@ -12576,7 +12584,7 @@
             <a:fld id="{04A728B0-2EE8-4602-849F-D2D469FDAEE2}" type="datetime1">
               <a:rPr lang="en-US"/>
               <a:pPr/>
-              <a:t>2/1/2022</a:t>
+              <a:t>2/2/2022</a:t>
             </a:fld>
             <a:endParaRPr lang="en-US" dirty="0"/>
           </a:p>
@@ -15257,7 +15265,7 @@
             <a:fld id="{E4BC88E4-0D26-41E6-8DE3-67CA588048C0}" type="datetime1">
               <a:rPr lang="en-US"/>
               <a:pPr/>
-              <a:t>2/1/2022</a:t>
+              <a:t>2/2/2022</a:t>
             </a:fld>
             <a:endParaRPr lang="en-US" dirty="0"/>
           </a:p>
@@ -17212,7 +17220,7 @@
             <a:fld id="{A9585ADC-08B8-45FD-80FE-46AC3DB310D7}" type="datetime1">
               <a:rPr lang="en-US"/>
               <a:pPr/>
-              <a:t>2/1/2022</a:t>
+              <a:t>2/2/2022</a:t>
             </a:fld>
             <a:endParaRPr lang="en-US" dirty="0"/>
           </a:p>
@@ -19601,7 +19609,7 @@
           <a:p>
             <a:fld id="{6DEDDF15-459B-4C18-9AB7-2CFC650F197B}" type="datetime1">
               <a:rPr lang="en-US"/>
-              <a:t>2/1/2022</a:t>
+              <a:t>2/2/2022</a:t>
             </a:fld>
             <a:endParaRPr lang="en-US" dirty="0"/>
           </a:p>
@@ -21434,7 +21442,7 @@
             <a:fld id="{04A728B0-2EE8-4602-849F-D2D469FDAEE2}" type="datetime1">
               <a:rPr lang="en-US"/>
               <a:pPr/>
-              <a:t>2/1/2022</a:t>
+              <a:t>2/2/2022</a:t>
             </a:fld>
             <a:endParaRPr lang="en-US" dirty="0"/>
           </a:p>
@@ -21895,7 +21903,7 @@
             <a:fld id="{04A728B0-2EE8-4602-849F-D2D469FDAEE2}" type="datetime1">
               <a:rPr lang="en-US"/>
               <a:pPr/>
-              <a:t>2/1/2022</a:t>
+              <a:t>2/2/2022</a:t>
             </a:fld>
             <a:endParaRPr lang="en-US" dirty="0"/>
           </a:p>
@@ -22216,7 +22224,7 @@
             <a:fld id="{91D32E29-F823-4652-9AE9-2D2F132296DA}" type="datetime1">
               <a:rPr lang="en-US"/>
               <a:pPr/>
-              <a:t>2/1/2022</a:t>
+              <a:t>2/2/2022</a:t>
             </a:fld>
             <a:endParaRPr lang="en-US" dirty="0"/>
           </a:p>
@@ -22798,7 +22806,7 @@
           <a:p>
             <a:fld id="{04A728B0-2EE8-4602-849F-D2D469FDAEE2}" type="datetime1">
               <a:rPr lang="en-US"/>
-              <a:t>2/1/2022</a:t>
+              <a:t>2/2/2022</a:t>
             </a:fld>
             <a:endParaRPr lang="en-US" dirty="0"/>
           </a:p>
@@ -23603,7 +23611,7 @@
             <a:fld id="{04A728B0-2EE8-4602-849F-D2D469FDAEE2}" type="datetime1">
               <a:rPr lang="en-US"/>
               <a:pPr/>
-              <a:t>2/1/2022</a:t>
+              <a:t>2/2/2022</a:t>
             </a:fld>
             <a:endParaRPr lang="en-US" dirty="0"/>
           </a:p>
@@ -24460,7 +24468,7 @@
             <a:fld id="{91D32E29-F823-4652-9AE9-2D2F132296DA}" type="datetime1">
               <a:rPr lang="en-US"/>
               <a:pPr/>
-              <a:t>2/1/2022</a:t>
+              <a:t>2/2/2022</a:t>
             </a:fld>
             <a:endParaRPr lang="en-US" dirty="0"/>
           </a:p>
@@ -25375,7 +25383,7 @@
             <a:fld id="{91D32E29-F823-4652-9AE9-2D2F132296DA}" type="datetime1">
               <a:rPr lang="en-US"/>
               <a:pPr/>
-              <a:t>2/1/2022</a:t>
+              <a:t>2/2/2022</a:t>
             </a:fld>
             <a:endParaRPr lang="en-US" dirty="0"/>
           </a:p>
@@ -26246,7 +26254,7 @@
             <a:fld id="{04A728B0-2EE8-4602-849F-D2D469FDAEE2}" type="datetime1">
               <a:rPr lang="en-US"/>
               <a:pPr/>
-              <a:t>2/1/2022</a:t>
+              <a:t>2/2/2022</a:t>
             </a:fld>
             <a:endParaRPr lang="en-US" dirty="0"/>
           </a:p>
@@ -33902,16 +33910,50 @@
             </a:endParaRPr>
           </a:p>
           <a:p>
+            <a:pPr>
+              <a:lnSpc>
+                <a:spcPct val="150000"/>
+              </a:lnSpc>
+              <a:spcBef>
+                <a:spcPts val="400"/>
+              </a:spcBef>
+              <a:spcAft>
+                <a:spcPts val="600"/>
+              </a:spcAft>
+            </a:pPr>
             <a:r>
-              <a:rPr lang="en-US" dirty="0"/>
-              <a:t>Briefly explain about the backend.</a:t>
+              <a:rPr lang="en-IN" sz="1800" dirty="0" err="1">
+                <a:effectLst/>
+                <a:latin typeface="Calibri" panose="020F0502020204030204" pitchFamily="34" charset="0"/>
+                <a:ea typeface="Times New Roman" panose="02020603050405020304" pitchFamily="18" charset="0"/>
+                <a:cs typeface="Calibri" panose="020F0502020204030204" pitchFamily="34" charset="0"/>
+              </a:rPr>
+              <a:t>Beaconsta</a:t>
             </a:r>
-          </a:p>
-          <a:p>
             <a:r>
-              <a:rPr lang="en-US" dirty="0"/>
-              <a:t>Explain about the connector and its capabilities and how it will benefit the users.</a:t>
+              <a:rPr lang="en-IN" sz="1800" dirty="0">
+                <a:effectLst/>
+                <a:latin typeface="Calibri" panose="020F0502020204030204" pitchFamily="34" charset="0"/>
+                <a:ea typeface="Times New Roman" panose="02020603050405020304" pitchFamily="18" charset="0"/>
+                <a:cs typeface="Calibri" panose="020F0502020204030204" pitchFamily="34" charset="0"/>
+              </a:rPr>
+              <a:t> is a modern QR Code platform. </a:t>
             </a:r>
+            <a:r>
+              <a:rPr lang="en-GB" sz="1800" dirty="0">
+                <a:effectLst/>
+                <a:latin typeface="Calibri" panose="020F0502020204030204" pitchFamily="34" charset="0"/>
+                <a:ea typeface="Times New Roman" panose="02020603050405020304" pitchFamily="18" charset="0"/>
+                <a:cs typeface="Calibri" panose="020F0502020204030204" pitchFamily="34" charset="0"/>
+              </a:rPr>
+              <a:t>Connect your physical-digital worlds, collect first-party data &amp; drive engagement - with an easy-to-use QR Code platform built for modern businesses. It provides QR code management services for an organization.</a:t>
+            </a:r>
+            <a:endParaRPr lang="en-IN" sz="1800" dirty="0">
+              <a:effectLst/>
+              <a:latin typeface="Calibri" panose="020F0502020204030204" pitchFamily="34" charset="0"/>
+              <a:ea typeface="Times New Roman" panose="02020603050405020304" pitchFamily="18" charset="0"/>
+              <a:cs typeface="Calibri" panose="020F0502020204030204" pitchFamily="34" charset="0"/>
+            </a:endParaRPr>
           </a:p>
         </p:txBody>
       </p:sp>
@@ -34083,10 +34125,60 @@
           <a:bodyPr/>
           <a:lstStyle/>
           <a:p>
-            <a:endParaRPr lang="en-IN"/>
+            <a:r>
+              <a:rPr lang="en-IN" sz="1800" dirty="0" err="1">
+                <a:effectLst/>
+                <a:latin typeface="Calibri" panose="020F0502020204030204" pitchFamily="34" charset="0"/>
+                <a:ea typeface="Yu Mincho" panose="02020400000000000000" pitchFamily="18" charset="-128"/>
+                <a:cs typeface="Arial" panose="020B0604020202020204" pitchFamily="34" charset="0"/>
+              </a:rPr>
+              <a:t>BeaconstacServices.services:countObject</a:t>
+            </a:r>
+            <a:r>
+              <a:rPr lang="en-IN" sz="1800" dirty="0">
+                <a:effectLst/>
+                <a:latin typeface="Calibri" panose="020F0502020204030204" pitchFamily="34" charset="0"/>
+                <a:ea typeface="Yu Mincho" panose="02020400000000000000" pitchFamily="18" charset="-128"/>
+                <a:cs typeface="Arial" panose="020B0604020202020204" pitchFamily="34" charset="0"/>
+              </a:rPr>
+              <a:t> (GET)</a:t>
+            </a:r>
+          </a:p>
+          <a:p>
+            <a:endParaRPr lang="en-IN" dirty="0"/>
           </a:p>
         </p:txBody>
       </p:sp>
+      <p:pic>
+        <p:nvPicPr>
+          <p:cNvPr id="9" name="Picture 8" descr="Graphical user interface&#10;&#10;Description automatically generated with medium confidence">
+            <a:extLst>
+              <a:ext uri="{FF2B5EF4-FFF2-40B4-BE49-F238E27FC236}">
+                <a16:creationId xmlns:a16="http://schemas.microsoft.com/office/drawing/2014/main" id="{A7B49360-BF81-4DB3-ADB5-B6B8BE534314}"/>
+              </a:ext>
+            </a:extLst>
+          </p:cNvPr>
+          <p:cNvPicPr>
+            <a:picLocks noChangeAspect="1"/>
+          </p:cNvPicPr>
+          <p:nvPr/>
+        </p:nvPicPr>
+        <p:blipFill>
+          <a:blip r:embed="rId2"/>
+          <a:stretch>
+            <a:fillRect/>
+          </a:stretch>
+        </p:blipFill>
+        <p:spPr>
+          <a:xfrm>
+            <a:off x="623392" y="2348880"/>
+            <a:ext cx="5731510" cy="3223895"/>
+          </a:xfrm>
+          <a:prstGeom prst="rect">
+            <a:avLst/>
+          </a:prstGeom>
+        </p:spPr>
+      </p:pic>
     </p:spTree>
     <p:extLst>
       <p:ext uri="{BB962C8B-B14F-4D97-AF65-F5344CB8AC3E}">
@@ -34101,6 +34193,177 @@
 </file>
 
 <file path=ppt/slides/slide4.xml><?xml version="1.0" encoding="utf-8"?>
+<p:sld xmlns:a="http://schemas.openxmlformats.org/drawingml/2006/main" xmlns:r="http://schemas.openxmlformats.org/officeDocument/2006/relationships" xmlns:p="http://schemas.openxmlformats.org/presentationml/2006/main">
+  <p:cSld>
+    <p:spTree>
+      <p:nvGrpSpPr>
+        <p:cNvPr id="1" name=""/>
+        <p:cNvGrpSpPr/>
+        <p:nvPr/>
+      </p:nvGrpSpPr>
+      <p:grpSpPr>
+        <a:xfrm>
+          <a:off x="0" y="0"/>
+          <a:ext cx="0" cy="0"/>
+          <a:chOff x="0" y="0"/>
+          <a:chExt cx="0" cy="0"/>
+        </a:xfrm>
+      </p:grpSpPr>
+      <p:sp>
+        <p:nvSpPr>
+          <p:cNvPr id="2" name="Title 1">
+            <a:extLst>
+              <a:ext uri="{FF2B5EF4-FFF2-40B4-BE49-F238E27FC236}">
+                <a16:creationId xmlns:a16="http://schemas.microsoft.com/office/drawing/2014/main" id="{6BB81E9D-118C-4A6C-9D0B-65C29C6D2549}"/>
+              </a:ext>
+            </a:extLst>
+          </p:cNvPr>
+          <p:cNvSpPr>
+            <a:spLocks noGrp="1"/>
+          </p:cNvSpPr>
+          <p:nvPr>
+            <p:ph type="title"/>
+          </p:nvPr>
+        </p:nvSpPr>
+        <p:spPr/>
+        <p:txBody>
+          <a:bodyPr/>
+          <a:lstStyle/>
+          <a:p>
+            <a:endParaRPr lang="en-IN"/>
+          </a:p>
+        </p:txBody>
+      </p:sp>
+      <p:sp>
+        <p:nvSpPr>
+          <p:cNvPr id="3" name="Footer Placeholder 2">
+            <a:extLst>
+              <a:ext uri="{FF2B5EF4-FFF2-40B4-BE49-F238E27FC236}">
+                <a16:creationId xmlns:a16="http://schemas.microsoft.com/office/drawing/2014/main" id="{36E699BE-4809-4768-8A9C-03A392208474}"/>
+              </a:ext>
+            </a:extLst>
+          </p:cNvPr>
+          <p:cNvSpPr>
+            <a:spLocks noGrp="1"/>
+          </p:cNvSpPr>
+          <p:nvPr>
+            <p:ph type="ftr" sz="quarter" idx="3"/>
+          </p:nvPr>
+        </p:nvSpPr>
+        <p:spPr/>
+        <p:txBody>
+          <a:bodyPr/>
+          <a:lstStyle/>
+          <a:p>
+            <a:r>
+              <a:rPr lang="en-US"/>
+              <a:t>© 2021 Software AG. All rights reserved. For internal use only and for Software AG Partners.</a:t>
+            </a:r>
+            <a:endParaRPr lang="en-US" dirty="0"/>
+          </a:p>
+        </p:txBody>
+      </p:sp>
+      <p:sp>
+        <p:nvSpPr>
+          <p:cNvPr id="4" name="Slide Number Placeholder 3">
+            <a:extLst>
+              <a:ext uri="{FF2B5EF4-FFF2-40B4-BE49-F238E27FC236}">
+                <a16:creationId xmlns:a16="http://schemas.microsoft.com/office/drawing/2014/main" id="{B7A8CE4A-DAE9-451E-B5EB-0FB2740CB04E}"/>
+              </a:ext>
+            </a:extLst>
+          </p:cNvPr>
+          <p:cNvSpPr>
+            <a:spLocks noGrp="1"/>
+          </p:cNvSpPr>
+          <p:nvPr>
+            <p:ph type="sldNum" sz="quarter" idx="4"/>
+          </p:nvPr>
+        </p:nvSpPr>
+        <p:spPr/>
+        <p:txBody>
+          <a:bodyPr/>
+          <a:lstStyle/>
+          <a:p>
+            <a:fld id="{22FF84AA-2C76-4AF1-8502-73D25D47F37C}" type="slidenum">
+              <a:rPr lang="en-US" smtClean="0"/>
+              <a:pPr/>
+              <a:t>4</a:t>
+            </a:fld>
+            <a:endParaRPr lang="en-US" dirty="0"/>
+          </a:p>
+        </p:txBody>
+      </p:sp>
+      <p:sp>
+        <p:nvSpPr>
+          <p:cNvPr id="5" name="Subtitle 4">
+            <a:extLst>
+              <a:ext uri="{FF2B5EF4-FFF2-40B4-BE49-F238E27FC236}">
+                <a16:creationId xmlns:a16="http://schemas.microsoft.com/office/drawing/2014/main" id="{79E9B966-C0F3-436E-86D6-4B7E1D63D017}"/>
+              </a:ext>
+            </a:extLst>
+          </p:cNvPr>
+          <p:cNvSpPr>
+            <a:spLocks noGrp="1"/>
+          </p:cNvSpPr>
+          <p:nvPr>
+            <p:ph type="subTitle" sz="quarter" idx="1"/>
+          </p:nvPr>
+        </p:nvSpPr>
+        <p:spPr/>
+        <p:txBody>
+          <a:bodyPr/>
+          <a:lstStyle/>
+          <a:p>
+            <a:endParaRPr lang="en-IN"/>
+          </a:p>
+        </p:txBody>
+      </p:sp>
+      <p:pic>
+        <p:nvPicPr>
+          <p:cNvPr id="7" name="Content Placeholder 6" descr="Graphical user interface, text, application, email&#10;&#10;Description automatically generated">
+            <a:extLst>
+              <a:ext uri="{FF2B5EF4-FFF2-40B4-BE49-F238E27FC236}">
+                <a16:creationId xmlns:a16="http://schemas.microsoft.com/office/drawing/2014/main" id="{340A5282-3511-433B-A1B0-55BB6BEC9997}"/>
+              </a:ext>
+            </a:extLst>
+          </p:cNvPr>
+          <p:cNvPicPr>
+            <a:picLocks noGrp="1" noChangeAspect="1"/>
+          </p:cNvPicPr>
+          <p:nvPr>
+            <p:ph sz="quarter" idx="21"/>
+          </p:nvPr>
+        </p:nvPicPr>
+        <p:blipFill>
+          <a:blip r:embed="rId2"/>
+          <a:stretch>
+            <a:fillRect/>
+          </a:stretch>
+        </p:blipFill>
+        <p:spPr>
+          <a:xfrm>
+            <a:off x="555250" y="1353017"/>
+            <a:ext cx="6660183" cy="4665663"/>
+          </a:xfrm>
+          <a:prstGeom prst="rect">
+            <a:avLst/>
+          </a:prstGeom>
+        </p:spPr>
+      </p:pic>
+    </p:spTree>
+    <p:extLst>
+      <p:ext uri="{BB962C8B-B14F-4D97-AF65-F5344CB8AC3E}">
+        <p14:creationId xmlns:p14="http://schemas.microsoft.com/office/powerpoint/2010/main" val="4173170038"/>
+      </p:ext>
+    </p:extLst>
+  </p:cSld>
+  <p:clrMapOvr>
+    <a:masterClrMapping/>
+  </p:clrMapOvr>
+</p:sld>
+</file>
+
+<file path=ppt/slides/slide5.xml><?xml version="1.0" encoding="utf-8"?>
 <p:sld xmlns:a="http://schemas.openxmlformats.org/drawingml/2006/main" xmlns:r="http://schemas.openxmlformats.org/officeDocument/2006/relationships" xmlns:p="http://schemas.openxmlformats.org/presentationml/2006/main">
   <p:cSld>
     <p:spTree>
@@ -34170,7 +34433,7 @@
             <a:fld id="{22FF84AA-2C76-4AF1-8502-73D25D47F37C}" type="slidenum">
               <a:rPr lang="en-US"/>
               <a:pPr/>
-              <a:t>4</a:t>
+              <a:t>5</a:t>
             </a:fld>
             <a:endParaRPr lang="en-US" dirty="0"/>
           </a:p>

</xml_diff>